<commit_message>
update doc, remove .vscode folder
</commit_message>
<xml_diff>
--- a/doc/project/report.pptx
+++ b/doc/project/report.pptx
@@ -6980,10 +6980,10 @@
       </p:sp>
       <p:pic>
         <p:nvPicPr>
-          <p:cNvPr id="4" name="Picture 3" descr="A screenshot of a computer screen&#10;&#10;Description automatically generated">
+          <p:cNvPr id="7" name="Picture 6" descr="A screenshot of a computer&#10;&#10;Description automatically generated">
             <a:extLst>
               <a:ext uri="{FF2B5EF4-FFF2-40B4-BE49-F238E27FC236}">
-                <a16:creationId xmlns:a16="http://schemas.microsoft.com/office/drawing/2014/main" id="{EDC4E59E-610C-2D4F-EEFD-6FB70DACDC96}"/>
+                <a16:creationId xmlns:a16="http://schemas.microsoft.com/office/drawing/2014/main" id="{93FE4FED-19CA-2EAD-A7B4-9CC790F5D573}"/>
               </a:ext>
             </a:extLst>
           </p:cNvPr>
@@ -7000,42 +7000,17 @@
         </p:blipFill>
         <p:spPr>
           <a:xfrm>
-            <a:off x="1" y="1216342"/>
-            <a:ext cx="6360160" cy="3472811"/>
+            <a:off x="458755" y="0"/>
+            <a:ext cx="11274490" cy="6858000"/>
           </a:xfrm>
           <a:prstGeom prst="rect">
             <a:avLst/>
           </a:prstGeom>
-        </p:spPr>
-      </p:pic>
-      <p:pic>
-        <p:nvPicPr>
-          <p:cNvPr id="5" name="Picture 4" descr="A screenshot of a computer&#10;&#10;Description automatically generated">
-            <a:extLst>
-              <a:ext uri="{FF2B5EF4-FFF2-40B4-BE49-F238E27FC236}">
-                <a16:creationId xmlns:a16="http://schemas.microsoft.com/office/drawing/2014/main" id="{D1689DA0-8E05-BF48-BAD6-90F9F30A8950}"/>
-              </a:ext>
-            </a:extLst>
-          </p:cNvPr>
-          <p:cNvPicPr>
-            <a:picLocks noChangeAspect="1"/>
-          </p:cNvPicPr>
-          <p:nvPr/>
-        </p:nvPicPr>
-        <p:blipFill>
-          <a:blip r:embed="rId3"/>
-          <a:stretch>
-            <a:fillRect/>
-          </a:stretch>
-        </p:blipFill>
-        <p:spPr>
-          <a:xfrm>
-            <a:off x="5120639" y="4655302"/>
-            <a:ext cx="7071361" cy="2254479"/>
-          </a:xfrm>
-          <a:prstGeom prst="rect">
-            <a:avLst/>
-          </a:prstGeom>
+          <a:ln w="19050">
+            <a:solidFill>
+              <a:srgbClr val="0070C0"/>
+            </a:solidFill>
+          </a:ln>
         </p:spPr>
       </p:pic>
     </p:spTree>
@@ -7210,6 +7185,41 @@
           </a:p>
         </p:txBody>
       </p:sp>
+      <p:pic>
+        <p:nvPicPr>
+          <p:cNvPr id="5" name="Picture 4" descr="A screenshot of a computer&#10;&#10;Description automatically generated">
+            <a:extLst>
+              <a:ext uri="{FF2B5EF4-FFF2-40B4-BE49-F238E27FC236}">
+                <a16:creationId xmlns:a16="http://schemas.microsoft.com/office/drawing/2014/main" id="{D1689DA0-8E05-BF48-BAD6-90F9F30A8950}"/>
+              </a:ext>
+            </a:extLst>
+          </p:cNvPr>
+          <p:cNvPicPr>
+            <a:picLocks noChangeAspect="1"/>
+          </p:cNvPicPr>
+          <p:nvPr/>
+        </p:nvPicPr>
+        <p:blipFill>
+          <a:blip r:embed="rId2"/>
+          <a:stretch>
+            <a:fillRect/>
+          </a:stretch>
+        </p:blipFill>
+        <p:spPr>
+          <a:xfrm>
+            <a:off x="1838959" y="1993382"/>
+            <a:ext cx="7071361" cy="2254479"/>
+          </a:xfrm>
+          <a:prstGeom prst="rect">
+            <a:avLst/>
+          </a:prstGeom>
+          <a:ln w="19050">
+            <a:solidFill>
+              <a:srgbClr val="0070C0"/>
+            </a:solidFill>
+          </a:ln>
+        </p:spPr>
+      </p:pic>
     </p:spTree>
     <p:extLst>
       <p:ext uri="{BB962C8B-B14F-4D97-AF65-F5344CB8AC3E}">
@@ -9486,7 +9496,40 @@
                 </a:solidFill>
                 <a:latin typeface="Times New Roman" panose="02020603050405020304" pitchFamily="18" charset="0"/>
               </a:rPr>
-              <a:t>ây dựng Dashboard theo dõi</a:t>
+              <a:t>ây dựng Dashboard</a:t>
+            </a:r>
+            <a:r>
+              <a:rPr lang="en-US" sz="2800" cap="none" dirty="0">
+                <a:solidFill>
+                  <a:schemeClr val="bg2">
+                    <a:lumMod val="50000"/>
+                  </a:schemeClr>
+                </a:solidFill>
+                <a:latin typeface="Times New Roman" panose="02020603050405020304" pitchFamily="18" charset="0"/>
+              </a:rPr>
+              <a:t> </a:t>
+            </a:r>
+            <a:r>
+              <a:rPr lang="en-US" sz="2800" cap="none" dirty="0" err="1">
+                <a:solidFill>
+                  <a:schemeClr val="bg2">
+                    <a:lumMod val="50000"/>
+                  </a:schemeClr>
+                </a:solidFill>
+                <a:latin typeface="Times New Roman" panose="02020603050405020304" pitchFamily="18" charset="0"/>
+              </a:rPr>
+              <a:t>để</a:t>
+            </a:r>
+            <a:r>
+              <a:rPr lang="vi-VN" sz="2800" cap="none" dirty="0">
+                <a:solidFill>
+                  <a:schemeClr val="bg2">
+                    <a:lumMod val="50000"/>
+                  </a:schemeClr>
+                </a:solidFill>
+                <a:latin typeface="Times New Roman" panose="02020603050405020304" pitchFamily="18" charset="0"/>
+              </a:rPr>
+              <a:t> theo dõi</a:t>
             </a:r>
             <a:r>
               <a:rPr lang="en-US" sz="2800" cap="none" dirty="0">
@@ -12020,6 +12063,11 @@
           <a:prstGeom prst="rect">
             <a:avLst/>
           </a:prstGeom>
+          <a:ln w="19050">
+            <a:solidFill>
+              <a:srgbClr val="0070C0"/>
+            </a:solidFill>
+          </a:ln>
         </p:spPr>
       </p:pic>
     </p:spTree>
@@ -12516,6 +12564,41 @@
           </a:p>
         </p:txBody>
       </p:sp>
+      <p:pic>
+        <p:nvPicPr>
+          <p:cNvPr id="5" name="Picture 4" descr="A screenshot of a computer&#10;&#10;Description automatically generated">
+            <a:extLst>
+              <a:ext uri="{FF2B5EF4-FFF2-40B4-BE49-F238E27FC236}">
+                <a16:creationId xmlns:a16="http://schemas.microsoft.com/office/drawing/2014/main" id="{C4E61AB0-7109-7384-DCD1-5752D9761C76}"/>
+              </a:ext>
+            </a:extLst>
+          </p:cNvPr>
+          <p:cNvPicPr>
+            <a:picLocks noChangeAspect="1"/>
+          </p:cNvPicPr>
+          <p:nvPr/>
+        </p:nvPicPr>
+        <p:blipFill>
+          <a:blip r:embed="rId2"/>
+          <a:stretch>
+            <a:fillRect/>
+          </a:stretch>
+        </p:blipFill>
+        <p:spPr>
+          <a:xfrm>
+            <a:off x="0" y="2046805"/>
+            <a:ext cx="12192000" cy="2764389"/>
+          </a:xfrm>
+          <a:prstGeom prst="rect">
+            <a:avLst/>
+          </a:prstGeom>
+          <a:ln w="19050">
+            <a:solidFill>
+              <a:srgbClr val="0070C0"/>
+            </a:solidFill>
+          </a:ln>
+        </p:spPr>
+      </p:pic>
     </p:spTree>
     <p:extLst>
       <p:ext uri="{BB962C8B-B14F-4D97-AF65-F5344CB8AC3E}">

</xml_diff>